<commit_message>
Created a medium course version of a short course, updated a short course.
</commit_message>
<xml_diff>
--- a/10 rounds and under/Skirt the Edges - 8 rounds - comstock/Skirt the Edges.pptx
+++ b/10 rounds and under/Skirt the Edges - 8 rounds - comstock/Skirt the Edges.pptx
@@ -259,7 +259,7 @@
               <a:pPr>
                 <a:defRPr/>
               </a:pPr>
-              <a:t>8/30/2019</a:t>
+              <a:t>9/6/2019</a:t>
             </a:fld>
             <a:endParaRPr lang="en-US"/>
           </a:p>
@@ -4160,14 +4160,14 @@
           <p:nvPr>
             <p:extLst>
               <p:ext uri="{D42A27DB-BD31-4B8C-83A1-F6EECF244321}">
-                <p14:modId xmlns:p14="http://schemas.microsoft.com/office/powerpoint/2010/main" val="200058241"/>
+                <p14:modId xmlns:p14="http://schemas.microsoft.com/office/powerpoint/2010/main" val="3706085666"/>
               </p:ext>
             </p:extLst>
           </p:nvPr>
         </p:nvGraphicFramePr>
         <p:xfrm>
           <a:off x="180474" y="223710"/>
-          <a:ext cx="7025777" cy="3045467"/>
+          <a:ext cx="7025777" cy="2780164"/>
         </p:xfrm>
         <a:graphic>
           <a:graphicData uri="http://schemas.openxmlformats.org/drawingml/2006/table">
@@ -4710,38 +4710,8 @@
                           <a:ea typeface="Arial" pitchFamily="34"/>
                           <a:cs typeface="Arial" pitchFamily="34"/>
                         </a:rPr>
-                        <a:t>GUN READY CONDITION : Pistol loaded and holstered. PCC loaded, safety on, held in weak hand buttstock touching belt. Strong hand wrist below belt.</a:t>
+                        <a:t>GUN READY CONDITION : Pistol loaded and holstered. PCC loaded, safety on, buttstock on belt.</a:t>
                       </a:r>
-                      <a:endParaRPr kumimoji="0" lang="en-US" sz="1100" b="1" i="0" u="none" strike="noStrike" cap="none" normalizeH="0" baseline="0" dirty="0">
-                        <a:ln>
-                          <a:noFill/>
-                        </a:ln>
-                        <a:solidFill>
-                          <a:schemeClr val="tx1"/>
-                        </a:solidFill>
-                        <a:effectLst/>
-                        <a:latin typeface="Arial" charset="0"/>
-                        <a:ea typeface="ＭＳ Ｐゴシック" pitchFamily="-112" charset="-128"/>
-                        <a:cs typeface="Times New Roman" pitchFamily="-112" charset="0"/>
-                      </a:endParaRPr>
-                    </a:p>
-                    <a:p>
-                      <a:pPr marL="0" marR="0" lvl="0" indent="0" algn="l" defTabSz="966788" rtl="0" eaLnBrk="1" fontAlgn="base" latinLnBrk="0" hangingPunct="1">
-                        <a:lnSpc>
-                          <a:spcPct val="100000"/>
-                        </a:lnSpc>
-                        <a:spcBef>
-                          <a:spcPct val="5000"/>
-                        </a:spcBef>
-                        <a:spcAft>
-                          <a:spcPct val="0"/>
-                        </a:spcAft>
-                        <a:buClrTx/>
-                        <a:buSzTx/>
-                        <a:buFontTx/>
-                        <a:buNone/>
-                        <a:tabLst/>
-                      </a:pPr>
                       <a:endParaRPr kumimoji="0" lang="en-US" sz="1100" b="1" i="0" u="none" strike="noStrike" cap="none" normalizeH="0" baseline="0" dirty="0">
                         <a:ln>
                           <a:noFill/>
@@ -5328,7 +5298,7 @@
         <p:spPr>
           <a:xfrm>
             <a:off x="341832" y="384561"/>
-            <a:ext cx="6699903" cy="4524315"/>
+            <a:ext cx="6699903" cy="4247317"/>
           </a:xfrm>
           <a:prstGeom prst="rect">
             <a:avLst/>
@@ -5357,7 +5327,7 @@
           <a:p>
             <a:r>
               <a:rPr lang="en-US" dirty="0"/>
-              <a:t>Skirt the Edges is an 8 round, 40 point, Comstock Speed Shoot. There are two IPSC targets, two pepper poppers, and two mini poppers. The best two hits on paper will score. Steel must fall to score. The start signal is audible.</a:t>
+              <a:t>Skirt the Edges is an 8 round, 40 point, Comstock Speed Shoot. There are two IPSC targets, one pepper popper, and three mini poppers. The best two hits on paper will score. Steel must fall to score. The start signal is audible.</a:t>
             </a:r>
           </a:p>
           <a:p>
@@ -5375,8 +5345,13 @@
           <a:p>
             <a:r>
               <a:rPr lang="en-US" dirty="0"/>
-              <a:t>PCC start position is standing in shooting box with loaded carbine held with weak hand, safety on, buttstock on belt, strong hand relaxed at side.</a:t>
-            </a:r>
+              <a:t>PCC start position is standing in shooting box with loaded carbine held with both hands, safety on, </a:t>
+            </a:r>
+            <a:r>
+              <a:rPr lang="en-US"/>
+              <a:t>buttstock touching belt.</a:t>
+            </a:r>
+            <a:endParaRPr lang="en-US" dirty="0"/>
           </a:p>
           <a:p>
             <a:endParaRPr lang="en-US" dirty="0"/>

</xml_diff>